<commit_message>
update all remaining project media and descriptions. Add hyperlink integration feature to project description based on regex
</commit_message>
<xml_diff>
--- a/src/media/template.pptx
+++ b/src/media/template.pptx
@@ -270,7 +270,7 @@
           <a:p>
             <a:fld id="{38FFC8AC-0B7A-4E14-879F-2D8A3532EEBD}" type="datetimeFigureOut">
               <a:rPr lang="en-US" smtClean="0"/>
-              <a:t>12/1/2023</a:t>
+              <a:t>12/13/2023</a:t>
             </a:fld>
             <a:endParaRPr lang="en-US"/>
           </a:p>
@@ -468,7 +468,7 @@
           <a:p>
             <a:fld id="{38FFC8AC-0B7A-4E14-879F-2D8A3532EEBD}" type="datetimeFigureOut">
               <a:rPr lang="en-US" smtClean="0"/>
-              <a:t>12/1/2023</a:t>
+              <a:t>12/13/2023</a:t>
             </a:fld>
             <a:endParaRPr lang="en-US"/>
           </a:p>
@@ -676,7 +676,7 @@
           <a:p>
             <a:fld id="{38FFC8AC-0B7A-4E14-879F-2D8A3532EEBD}" type="datetimeFigureOut">
               <a:rPr lang="en-US" smtClean="0"/>
-              <a:t>12/1/2023</a:t>
+              <a:t>12/13/2023</a:t>
             </a:fld>
             <a:endParaRPr lang="en-US"/>
           </a:p>
@@ -874,7 +874,7 @@
           <a:p>
             <a:fld id="{38FFC8AC-0B7A-4E14-879F-2D8A3532EEBD}" type="datetimeFigureOut">
               <a:rPr lang="en-US" smtClean="0"/>
-              <a:t>12/1/2023</a:t>
+              <a:t>12/13/2023</a:t>
             </a:fld>
             <a:endParaRPr lang="en-US"/>
           </a:p>
@@ -1149,7 +1149,7 @@
           <a:p>
             <a:fld id="{38FFC8AC-0B7A-4E14-879F-2D8A3532EEBD}" type="datetimeFigureOut">
               <a:rPr lang="en-US" smtClean="0"/>
-              <a:t>12/1/2023</a:t>
+              <a:t>12/13/2023</a:t>
             </a:fld>
             <a:endParaRPr lang="en-US"/>
           </a:p>
@@ -1414,7 +1414,7 @@
           <a:p>
             <a:fld id="{38FFC8AC-0B7A-4E14-879F-2D8A3532EEBD}" type="datetimeFigureOut">
               <a:rPr lang="en-US" smtClean="0"/>
-              <a:t>12/1/2023</a:t>
+              <a:t>12/13/2023</a:t>
             </a:fld>
             <a:endParaRPr lang="en-US"/>
           </a:p>
@@ -1826,7 +1826,7 @@
           <a:p>
             <a:fld id="{38FFC8AC-0B7A-4E14-879F-2D8A3532EEBD}" type="datetimeFigureOut">
               <a:rPr lang="en-US" smtClean="0"/>
-              <a:t>12/1/2023</a:t>
+              <a:t>12/13/2023</a:t>
             </a:fld>
             <a:endParaRPr lang="en-US"/>
           </a:p>
@@ -1967,7 +1967,7 @@
           <a:p>
             <a:fld id="{38FFC8AC-0B7A-4E14-879F-2D8A3532EEBD}" type="datetimeFigureOut">
               <a:rPr lang="en-US" smtClean="0"/>
-              <a:t>12/1/2023</a:t>
+              <a:t>12/13/2023</a:t>
             </a:fld>
             <a:endParaRPr lang="en-US"/>
           </a:p>
@@ -2080,7 +2080,7 @@
           <a:p>
             <a:fld id="{38FFC8AC-0B7A-4E14-879F-2D8A3532EEBD}" type="datetimeFigureOut">
               <a:rPr lang="en-US" smtClean="0"/>
-              <a:t>12/1/2023</a:t>
+              <a:t>12/13/2023</a:t>
             </a:fld>
             <a:endParaRPr lang="en-US"/>
           </a:p>
@@ -2391,7 +2391,7 @@
           <a:p>
             <a:fld id="{38FFC8AC-0B7A-4E14-879F-2D8A3532EEBD}" type="datetimeFigureOut">
               <a:rPr lang="en-US" smtClean="0"/>
-              <a:t>12/1/2023</a:t>
+              <a:t>12/13/2023</a:t>
             </a:fld>
             <a:endParaRPr lang="en-US"/>
           </a:p>
@@ -2679,7 +2679,7 @@
           <a:p>
             <a:fld id="{38FFC8AC-0B7A-4E14-879F-2D8A3532EEBD}" type="datetimeFigureOut">
               <a:rPr lang="en-US" smtClean="0"/>
-              <a:t>12/1/2023</a:t>
+              <a:t>12/13/2023</a:t>
             </a:fld>
             <a:endParaRPr lang="en-US"/>
           </a:p>
@@ -2923,7 +2923,7 @@
           <a:p>
             <a:fld id="{38FFC8AC-0B7A-4E14-879F-2D8A3532EEBD}" type="datetimeFigureOut">
               <a:rPr lang="en-US" smtClean="0"/>
-              <a:t>12/1/2023</a:t>
+              <a:t>12/13/2023</a:t>
             </a:fld>
             <a:endParaRPr lang="en-US"/>
           </a:p>
@@ -3799,36 +3799,6 @@
           </p:style>
         </p:cxnSp>
       </p:grpSp>
-      <p:pic>
-        <p:nvPicPr>
-          <p:cNvPr id="3" name="Picture 2">
-            <a:extLst>
-              <a:ext uri="{FF2B5EF4-FFF2-40B4-BE49-F238E27FC236}">
-                <a16:creationId xmlns:a16="http://schemas.microsoft.com/office/drawing/2014/main" id="{FA71B8F8-3C31-032E-D576-39B8A9E0F8BC}"/>
-              </a:ext>
-            </a:extLst>
-          </p:cNvPr>
-          <p:cNvPicPr>
-            <a:picLocks noChangeAspect="1"/>
-          </p:cNvPicPr>
-          <p:nvPr/>
-        </p:nvPicPr>
-        <p:blipFill>
-          <a:blip r:embed="rId2"/>
-          <a:stretch>
-            <a:fillRect/>
-          </a:stretch>
-        </p:blipFill>
-        <p:spPr>
-          <a:xfrm>
-            <a:off x="3668313" y="685798"/>
-            <a:ext cx="4855373" cy="5486396"/>
-          </a:xfrm>
-          <a:prstGeom prst="rect">
-            <a:avLst/>
-          </a:prstGeom>
-        </p:spPr>
-      </p:pic>
     </p:spTree>
     <p:extLst>
       <p:ext uri="{BB962C8B-B14F-4D97-AF65-F5344CB8AC3E}">

</xml_diff>